<commit_message>
Modificato report dei risultati
</commit_message>
<xml_diff>
--- a/Documentazione Protocollo eGLU/Report dei risultati.pptx
+++ b/Documentazione Protocollo eGLU/Report dei risultati.pptx
@@ -18006,14 +18006,14 @@
           <p:nvPr>
             <p:extLst>
               <p:ext uri="{D42A27DB-BD31-4B8C-83A1-F6EECF244321}">
-                <p14:modId xmlns:p14="http://schemas.microsoft.com/office/powerpoint/2010/main" val="3168361565"/>
+                <p14:modId xmlns:p14="http://schemas.microsoft.com/office/powerpoint/2010/main" val="3672298403"/>
               </p:ext>
             </p:extLst>
           </p:nvPr>
         </p:nvGraphicFramePr>
         <p:xfrm>
           <a:off x="420975" y="888225"/>
-          <a:ext cx="7995600" cy="3672720"/>
+          <a:ext cx="7995600" cy="3555910"/>
         </p:xfrm>
         <a:graphic>
           <a:graphicData uri="http://schemas.openxmlformats.org/drawingml/2006/table">
@@ -18411,7 +18411,7 @@
                           <a:latin typeface="Titillium Web"/>
                           <a:sym typeface="Titillium Web"/>
                         </a:rPr>
-                        <a:t>Molte volte consultare la funzione «Cerca nel sito» non ha fornito infromazioni rilevanti per il compito da completare. Provancando uno spreco di risorse in termine di tempo e frustazione nell’uso dell’applicazione.</a:t>
+                        <a:t>Molte volte consultare la funzione «Cerca nel sito» non ha fornito infromazioni rilevanti per il compito da completare, causando spreco di tempo e frustazione nell’utente.</a:t>
                       </a:r>
                       <a:endParaRPr sz="900" dirty="0">
                         <a:solidFill>
@@ -18623,7 +18623,7 @@
                           <a:latin typeface="+mj-lt"/>
                           <a:sym typeface="Titillium Web"/>
                         </a:rPr>
-                        <a:t>Nomi della barra dei menu non descrivono pienamente ciò che contengono</a:t>
+                        <a:t>I nomi della barra dei menu non descrivono pienamente ciò che contengono</a:t>
                       </a:r>
                       <a:endParaRPr dirty="0">
                         <a:solidFill>
@@ -18689,7 +18689,7 @@
                           <a:cs typeface="Titillium Web"/>
                           <a:sym typeface="Titillium Web"/>
                         </a:rPr>
-                        <a:t>I partecipanti non sempre riescono a capire che informazioni contiene una voce della barra dei menu solo leggendo il suo nome. Molte volte il partecipante ha dovuto aprire la voce per capire se il contenuto fosse utile per quello che stesse cercando. </a:t>
+                        <a:t>I partecipanti non sempre sono riusciti a intuire il contenuto delle voci presenti nella barra dei menu solo leggendone il nome. Molte volte il partecipante sotto osservazione ha dovuto aprire una specifica voce per capire se il contenuto fosse utile al suo scopo. </a:t>
                       </a:r>
                       <a:endParaRPr sz="900" dirty="0">
                         <a:solidFill>
@@ -18784,10 +18784,33 @@
                         </a:rPr>
                         <a:t>Coerenza e standard </a:t>
                       </a:r>
-                      <a:endParaRPr dirty="0">
+                    </a:p>
+                    <a:p>
+                      <a:pPr marL="285750" lvl="0" indent="-285750" algn="l" rtl="0">
+                        <a:spcBef>
+                          <a:spcPts val="0"/>
+                        </a:spcBef>
+                        <a:spcAft>
+                          <a:spcPts val="0"/>
+                        </a:spcAft>
+                        <a:buClr>
+                          <a:schemeClr val="dk1"/>
+                        </a:buClr>
+                        <a:buSzPts val="1100"/>
+                        <a:buFont typeface="Arial" panose="020B0604020202020204" pitchFamily="34" charset="0"/>
+                        <a:buChar char="•"/>
+                      </a:pPr>
+                      <a:r>
+                        <a:rPr lang="it-IT" sz="900" dirty="0">
+                          <a:latin typeface="Titillium Web" panose="00000500000000000000" pitchFamily="2" charset="0"/>
+                        </a:rPr>
+                        <a:t>Riconoscimento piuttosto di memorizzazione</a:t>
+                      </a:r>
+                      <a:endParaRPr sz="900" dirty="0">
                         <a:solidFill>
                           <a:schemeClr val="tx1"/>
                         </a:solidFill>
+                        <a:latin typeface="Titillium Web" panose="00000500000000000000" pitchFamily="2" charset="0"/>
                       </a:endParaRPr>
                     </a:p>
                     <a:p>
@@ -18958,7 +18981,7 @@
                           <a:latin typeface="Titillium Web"/>
                           <a:sym typeface="Titillium Web"/>
                         </a:rPr>
-                        <a:t>n partecipante ha espresso che preferirebbe visualizzare le sotto-voci delle voci della barra dei menu semplicemente passando il cursore sopra una voce, in modo da eseguire una ricerca più veloce.</a:t>
+                        <a:t>n partecipante ha asserito che preferirebbe visualizzare le sotto-voci dei titoli presenti nella barra dei menu semplicemente passandoci il cursore sopra, in modo da ottimizzare la navigazione.</a:t>
                       </a:r>
                       <a:endParaRPr dirty="0">
                         <a:solidFill>

</xml_diff>